<commit_message>
- Week 12 lectures - Lecture 11.2 Modules notebook
</commit_message>
<xml_diff>
--- a/lectures/week12/lecture2/slides/week12_lecture2.pptx
+++ b/lectures/week12/lecture2/slides/week12_lecture2.pptx
@@ -6,9 +6,14 @@
   </p:sldMasterIdLst>
   <p:sldIdLst>
     <p:sldId id="256" r:id="rId2"/>
-    <p:sldId id="623" r:id="rId3"/>
-    <p:sldId id="621" r:id="rId4"/>
-    <p:sldId id="622" r:id="rId5"/>
+    <p:sldId id="259" r:id="rId3"/>
+    <p:sldId id="427" r:id="rId4"/>
+    <p:sldId id="435" r:id="rId5"/>
+    <p:sldId id="436" r:id="rId6"/>
+    <p:sldId id="437" r:id="rId7"/>
+    <p:sldId id="438" r:id="rId8"/>
+    <p:sldId id="439" r:id="rId9"/>
+    <p:sldId id="434" r:id="rId10"/>
   </p:sldIdLst>
   <p:sldSz cx="12192000" cy="6858000"/>
   <p:notesSz cx="6858000" cy="9144000"/>
@@ -113,9 +118,14 @@
         <p14:section name="Default Section" id="{122D9F3D-F7CA-43FE-9E2E-5C007936740A}">
           <p14:sldIdLst>
             <p14:sldId id="256"/>
-            <p14:sldId id="623"/>
-            <p14:sldId id="621"/>
-            <p14:sldId id="622"/>
+            <p14:sldId id="259"/>
+            <p14:sldId id="427"/>
+            <p14:sldId id="435"/>
+            <p14:sldId id="436"/>
+            <p14:sldId id="437"/>
+            <p14:sldId id="438"/>
+            <p14:sldId id="439"/>
+            <p14:sldId id="434"/>
           </p14:sldIdLst>
         </p14:section>
       </p14:sectionLst>
@@ -246,7 +256,7 @@
     </p:spTree>
     <p:extLst>
       <p:ext uri="{BB962C8B-B14F-4D97-AF65-F5344CB8AC3E}">
-        <p14:creationId xmlns:p14="http://schemas.microsoft.com/office/powerpoint/2010/main" val="3890169408"/>
+        <p14:creationId xmlns:p14="http://schemas.microsoft.com/office/powerpoint/2010/main" val="1224602702"/>
       </p:ext>
     </p:extLst>
   </p:cSld>
@@ -444,7 +454,7 @@
     </p:spTree>
     <p:extLst>
       <p:ext uri="{BB962C8B-B14F-4D97-AF65-F5344CB8AC3E}">
-        <p14:creationId xmlns:p14="http://schemas.microsoft.com/office/powerpoint/2010/main" val="3234460749"/>
+        <p14:creationId xmlns:p14="http://schemas.microsoft.com/office/powerpoint/2010/main" val="1163592518"/>
       </p:ext>
     </p:extLst>
   </p:cSld>
@@ -642,7 +652,7 @@
     </p:spTree>
     <p:extLst>
       <p:ext uri="{BB962C8B-B14F-4D97-AF65-F5344CB8AC3E}">
-        <p14:creationId xmlns:p14="http://schemas.microsoft.com/office/powerpoint/2010/main" val="1789763118"/>
+        <p14:creationId xmlns:p14="http://schemas.microsoft.com/office/powerpoint/2010/main" val="1533003803"/>
       </p:ext>
     </p:extLst>
   </p:cSld>
@@ -840,7 +850,7 @@
     </p:spTree>
     <p:extLst>
       <p:ext uri="{BB962C8B-B14F-4D97-AF65-F5344CB8AC3E}">
-        <p14:creationId xmlns:p14="http://schemas.microsoft.com/office/powerpoint/2010/main" val="3543007405"/>
+        <p14:creationId xmlns:p14="http://schemas.microsoft.com/office/powerpoint/2010/main" val="414824189"/>
       </p:ext>
     </p:extLst>
   </p:cSld>
@@ -1038,7 +1048,7 @@
     </p:spTree>
     <p:extLst>
       <p:ext uri="{BB962C8B-B14F-4D97-AF65-F5344CB8AC3E}">
-        <p14:creationId xmlns:p14="http://schemas.microsoft.com/office/powerpoint/2010/main" val="3510828080"/>
+        <p14:creationId xmlns:p14="http://schemas.microsoft.com/office/powerpoint/2010/main" val="1070283112"/>
       </p:ext>
     </p:extLst>
   </p:cSld>
@@ -1236,7 +1246,7 @@
     </p:spTree>
     <p:extLst>
       <p:ext uri="{BB962C8B-B14F-4D97-AF65-F5344CB8AC3E}">
-        <p14:creationId xmlns:p14="http://schemas.microsoft.com/office/powerpoint/2010/main" val="1264456580"/>
+        <p14:creationId xmlns:p14="http://schemas.microsoft.com/office/powerpoint/2010/main" val="717312739"/>
       </p:ext>
     </p:extLst>
   </p:cSld>
@@ -1434,7 +1444,7 @@
     </p:spTree>
     <p:extLst>
       <p:ext uri="{BB962C8B-B14F-4D97-AF65-F5344CB8AC3E}">
-        <p14:creationId xmlns:p14="http://schemas.microsoft.com/office/powerpoint/2010/main" val="4128839276"/>
+        <p14:creationId xmlns:p14="http://schemas.microsoft.com/office/powerpoint/2010/main" val="1364264677"/>
       </p:ext>
     </p:extLst>
   </p:cSld>
@@ -1585,7 +1595,7 @@
     </p:spTree>
     <p:extLst>
       <p:ext uri="{BB962C8B-B14F-4D97-AF65-F5344CB8AC3E}">
-        <p14:creationId xmlns:p14="http://schemas.microsoft.com/office/powerpoint/2010/main" val="1715033960"/>
+        <p14:creationId xmlns:p14="http://schemas.microsoft.com/office/powerpoint/2010/main" val="2861566036"/>
       </p:ext>
     </p:extLst>
   </p:cSld>
@@ -1930,7 +1940,12 @@
             <p:ph type="ctrTitle"/>
           </p:nvPr>
         </p:nvSpPr>
-        <p:spPr/>
+        <p:spPr>
+          <a:xfrm>
+            <a:off x="335947" y="2996610"/>
+            <a:ext cx="11391065" cy="1268070"/>
+          </a:xfrm>
+        </p:spPr>
         <p:txBody>
           <a:bodyPr>
             <a:normAutofit/>
@@ -1944,38 +1959,14 @@
             <a:r>
               <a:rPr lang="en-US" dirty="0">
                 <a:solidFill>
-                  <a:schemeClr val="accent1"/>
+                  <a:srgbClr val="CC99FF"/>
                 </a:solidFill>
               </a:rPr>
               <a:t>,</a:t>
             </a:r>
             <a:r>
               <a:rPr lang="en-US" dirty="0"/>
-              <a:t> NumPy</a:t>
-            </a:r>
-            <a:r>
-              <a:rPr lang="en-US" dirty="0">
-                <a:solidFill>
-                  <a:schemeClr val="accent1"/>
-                </a:solidFill>
-              </a:rPr>
-              <a:t>,</a:t>
-            </a:r>
-            <a:r>
-              <a:rPr lang="en-US" dirty="0"/>
-              <a:t> Matplotlib</a:t>
-            </a:r>
-            <a:r>
-              <a:rPr lang="en-US" dirty="0">
-                <a:solidFill>
-                  <a:schemeClr val="accent6"/>
-                </a:solidFill>
-              </a:rPr>
-              <a:t>/</a:t>
-            </a:r>
-            <a:r>
-              <a:rPr lang="en-US" dirty="0"/>
-              <a:t>Seaborn</a:t>
+              <a:t> data visualization</a:t>
             </a:r>
             <a:r>
               <a:rPr lang="en-US" dirty="0">
@@ -2184,7 +2175,7 @@
             <a:r>
               <a:rPr lang="en-US" b="1" dirty="0">
                 <a:solidFill>
-                  <a:schemeClr val="accent1"/>
+                  <a:srgbClr val="00FF00"/>
                 </a:solidFill>
               </a:rPr>
               <a:t>12.1</a:t>
@@ -2194,70 +2185,15 @@
             <a:pPr lvl="1"/>
             <a:r>
               <a:rPr lang="en-US" dirty="0"/>
-              <a:t>Installing third</a:t>
+              <a:t>Pandas</a:t>
             </a:r>
             <a:r>
               <a:rPr lang="en-US" dirty="0">
                 <a:solidFill>
-                  <a:schemeClr val="accent6"/>
-                </a:solidFill>
-              </a:rPr>
-              <a:t>-</a:t>
-            </a:r>
-            <a:r>
-              <a:rPr lang="en-US" dirty="0"/>
-              <a:t>party packages</a:t>
-            </a:r>
-            <a:r>
-              <a:rPr lang="en-US" dirty="0">
-                <a:solidFill>
                   <a:schemeClr val="accent2"/>
                 </a:solidFill>
               </a:rPr>
-              <a:t>,</a:t>
-            </a:r>
-            <a:r>
-              <a:rPr lang="en-US" dirty="0"/>
-              <a:t> managing environments</a:t>
-            </a:r>
-            <a:r>
-              <a:rPr lang="en-US" dirty="0">
-                <a:solidFill>
-                  <a:schemeClr val="accent2"/>
-                </a:solidFill>
-              </a:rPr>
-              <a:t>,</a:t>
-            </a:r>
-            <a:r>
-              <a:rPr lang="en-US" dirty="0"/>
-              <a:t> and Pandas</a:t>
-            </a:r>
-            <a:r>
-              <a:rPr lang="en-US" dirty="0">
-                <a:solidFill>
-                  <a:schemeClr val="accent2"/>
-                </a:solidFill>
-              </a:rPr>
               <a:t>.</a:t>
-            </a:r>
-          </a:p>
-          <a:p>
-            <a:pPr lvl="1"/>
-            <a:r>
-              <a:rPr lang="en-US" dirty="0"/>
-              <a:t>Reading</a:t>
-            </a:r>
-            <a:r>
-              <a:rPr lang="en-US" dirty="0">
-                <a:solidFill>
-                  <a:schemeClr val="accent2"/>
-                </a:solidFill>
-              </a:rPr>
-              <a:t>:</a:t>
-            </a:r>
-            <a:r>
-              <a:rPr lang="en-US" dirty="0"/>
-              <a:t> Chapter 12</a:t>
             </a:r>
           </a:p>
           <a:p>
@@ -2268,7 +2204,7 @@
             <a:r>
               <a:rPr lang="en-US" b="1" dirty="0">
                 <a:solidFill>
-                  <a:schemeClr val="accent1"/>
+                  <a:srgbClr val="00FF00"/>
                 </a:solidFill>
               </a:rPr>
               <a:t>12.2</a:t>
@@ -2290,7 +2226,7 @@
             </a:r>
             <a:r>
               <a:rPr lang="en-US" b="1" dirty="0"/>
-              <a:t> NumPy</a:t>
+              <a:t> Data Visualization</a:t>
             </a:r>
             <a:r>
               <a:rPr lang="en-US" b="1" dirty="0">
@@ -2298,50 +2234,7 @@
                   <a:schemeClr val="accent2"/>
                 </a:solidFill>
               </a:rPr>
-              <a:t>,</a:t>
-            </a:r>
-            <a:r>
-              <a:rPr lang="en-US" b="1" dirty="0"/>
-              <a:t> Matplotlib</a:t>
-            </a:r>
-            <a:r>
-              <a:rPr lang="en-US" b="1" dirty="0">
-                <a:solidFill>
-                  <a:schemeClr val="accent6"/>
-                </a:solidFill>
-              </a:rPr>
-              <a:t>/</a:t>
-            </a:r>
-            <a:r>
-              <a:rPr lang="en-US" b="1" dirty="0"/>
-              <a:t>Seaborn</a:t>
-            </a:r>
-            <a:r>
-              <a:rPr lang="en-US" b="1" dirty="0">
-                <a:solidFill>
-                  <a:schemeClr val="accent2"/>
-                </a:solidFill>
-              </a:rPr>
               <a:t>.</a:t>
-            </a:r>
-          </a:p>
-          <a:p>
-            <a:pPr lvl="1"/>
-            <a:r>
-              <a:rPr lang="en-US" b="1" dirty="0"/>
-              <a:t>Reading</a:t>
-            </a:r>
-            <a:r>
-              <a:rPr lang="en-US" b="1" dirty="0">
-                <a:solidFill>
-                  <a:schemeClr val="accent2"/>
-                </a:solidFill>
-              </a:rPr>
-              <a:t>:</a:t>
-            </a:r>
-            <a:r>
-              <a:rPr lang="en-US" b="1" dirty="0"/>
-              <a:t> Chapter 12</a:t>
             </a:r>
           </a:p>
           <a:p>
@@ -2352,7 +2245,7 @@
             <a:r>
               <a:rPr lang="en-US" b="1" dirty="0">
                 <a:solidFill>
-                  <a:schemeClr val="accent1"/>
+                  <a:srgbClr val="00FF00"/>
                 </a:solidFill>
               </a:rPr>
               <a:t>12.3</a:t>
@@ -2406,7 +2299,7 @@
     </p:spTree>
     <p:extLst>
       <p:ext uri="{BB962C8B-B14F-4D97-AF65-F5344CB8AC3E}">
-        <p14:creationId xmlns:p14="http://schemas.microsoft.com/office/powerpoint/2010/main" val="1779898750"/>
+        <p14:creationId xmlns:p14="http://schemas.microsoft.com/office/powerpoint/2010/main" val="2832463924"/>
       </p:ext>
     </p:extLst>
   </p:cSld>
@@ -2435,10 +2328,127 @@
       </p:grpSpPr>
       <p:sp>
         <p:nvSpPr>
-          <p:cNvPr id="4" name="Rectangle 3">
+          <p:cNvPr id="2" name="Title 1">
             <a:extLst>
               <a:ext uri="{FF2B5EF4-FFF2-40B4-BE49-F238E27FC236}">
-                <a16:creationId xmlns:a16="http://schemas.microsoft.com/office/drawing/2014/main" id="{6D690434-607E-C50C-3C03-815F5BC71F42}"/>
+                <a16:creationId xmlns:a16="http://schemas.microsoft.com/office/drawing/2014/main" id="{70D82EB2-A634-AC14-6086-DD540C674CE9}"/>
+              </a:ext>
+            </a:extLst>
+          </p:cNvPr>
+          <p:cNvSpPr>
+            <a:spLocks noGrp="1"/>
+          </p:cNvSpPr>
+          <p:nvPr>
+            <p:ph type="title"/>
+          </p:nvPr>
+        </p:nvSpPr>
+        <p:spPr/>
+        <p:txBody>
+          <a:bodyPr>
+            <a:normAutofit fontScale="90000"/>
+          </a:bodyPr>
+          <a:lstStyle/>
+          <a:p>
+            <a:r>
+              <a:rPr lang="en-US" b="1" dirty="0"/>
+              <a:t>The </a:t>
+            </a:r>
+            <a:r>
+              <a:rPr lang="en-US" b="1" dirty="0">
+                <a:solidFill>
+                  <a:srgbClr val="00FF00"/>
+                </a:solidFill>
+              </a:rPr>
+              <a:t>csv</a:t>
+            </a:r>
+            <a:r>
+              <a:rPr lang="en-US" b="1" dirty="0"/>
+              <a:t> Module</a:t>
+            </a:r>
+            <a:r>
+              <a:rPr lang="en-US" b="1" dirty="0">
+                <a:solidFill>
+                  <a:srgbClr val="CC99FF"/>
+                </a:solidFill>
+              </a:rPr>
+              <a:t>.</a:t>
+            </a:r>
+          </a:p>
+        </p:txBody>
+      </p:sp>
+      <p:sp>
+        <p:nvSpPr>
+          <p:cNvPr id="3" name="Content Placeholder 2">
+            <a:extLst>
+              <a:ext uri="{FF2B5EF4-FFF2-40B4-BE49-F238E27FC236}">
+                <a16:creationId xmlns:a16="http://schemas.microsoft.com/office/drawing/2014/main" id="{9F383B58-11FE-8CE3-CA97-291A34D394C3}"/>
+              </a:ext>
+            </a:extLst>
+          </p:cNvPr>
+          <p:cNvSpPr>
+            <a:spLocks noGrp="1"/>
+          </p:cNvSpPr>
+          <p:nvPr>
+            <p:ph idx="1"/>
+          </p:nvPr>
+        </p:nvSpPr>
+        <p:spPr>
+          <a:xfrm>
+            <a:off x="838200" y="1825624"/>
+            <a:ext cx="6040448" cy="4835479"/>
+          </a:xfrm>
+        </p:spPr>
+        <p:txBody>
+          <a:bodyPr/>
+          <a:lstStyle/>
+          <a:p>
+            <a:r>
+              <a:rPr lang="en-US" dirty="0"/>
+              <a:t>Remember the csv module from last week</a:t>
+            </a:r>
+            <a:r>
+              <a:rPr lang="en-US" dirty="0">
+                <a:solidFill>
+                  <a:srgbClr val="CC99FF"/>
+                </a:solidFill>
+              </a:rPr>
+              <a:t>?</a:t>
+            </a:r>
+          </a:p>
+          <a:p>
+            <a:r>
+              <a:rPr lang="en-US" dirty="0"/>
+              <a:t>Let</a:t>
+            </a:r>
+            <a:r>
+              <a:rPr lang="en-US" dirty="0">
+                <a:solidFill>
+                  <a:srgbClr val="CC99FF"/>
+                </a:solidFill>
+              </a:rPr>
+              <a:t>’</a:t>
+            </a:r>
+            <a:r>
+              <a:rPr lang="en-US" dirty="0"/>
+              <a:t>s see how we can use it to work with a dataset of past presidential elections in the United States</a:t>
+            </a:r>
+            <a:r>
+              <a:rPr lang="en-US" dirty="0">
+                <a:solidFill>
+                  <a:srgbClr val="CC99FF"/>
+                </a:solidFill>
+              </a:rPr>
+              <a:t>.</a:t>
+            </a:r>
+          </a:p>
+        </p:txBody>
+      </p:sp>
+      <p:sp>
+        <p:nvSpPr>
+          <p:cNvPr id="4" name="Rectangle: Rounded Corners 3">
+            <a:extLst>
+              <a:ext uri="{FF2B5EF4-FFF2-40B4-BE49-F238E27FC236}">
+                <a16:creationId xmlns:a16="http://schemas.microsoft.com/office/drawing/2014/main" id="{29AC7AAD-8AA0-8DEE-049C-0F4CC8EFC45F}"/>
               </a:ext>
             </a:extLst>
           </p:cNvPr>
@@ -2447,17 +2457,17 @@
         </p:nvSpPr>
         <p:spPr>
           <a:xfrm>
-            <a:off x="7203112" y="495546"/>
-            <a:ext cx="4988888" cy="6235618"/>
+            <a:off x="7844590" y="1949006"/>
+            <a:ext cx="3958389" cy="4418765"/>
           </a:xfrm>
-          <a:prstGeom prst="rect">
+          <a:prstGeom prst="roundRect">
             <a:avLst/>
           </a:prstGeom>
-          <a:solidFill>
-            <a:srgbClr val="FFFFFF"/>
-          </a:solidFill>
-          <a:ln>
-            <a:noFill/>
+          <a:noFill/>
+          <a:ln w="76200">
+            <a:solidFill>
+              <a:schemeClr val="accent2"/>
+            </a:solidFill>
           </a:ln>
         </p:spPr>
         <p:style>
@@ -2480,17 +2490,96 @@
           <a:bodyPr rtlCol="0" anchor="ctr"/>
           <a:lstStyle/>
           <a:p>
-            <a:pPr algn="ctr"/>
-            <a:endParaRPr lang="en-US"/>
+            <a:r>
+              <a:rPr lang="en-US" sz="4400" b="1" dirty="0">
+                <a:solidFill>
+                  <a:srgbClr val="FFFFFF"/>
+                </a:solidFill>
+              </a:rPr>
+              <a:t>Open your notebook</a:t>
+            </a:r>
+          </a:p>
+          <a:p>
+            <a:endParaRPr lang="en-US" sz="4400" b="1" dirty="0">
+              <a:solidFill>
+                <a:srgbClr val="FFFFFF"/>
+              </a:solidFill>
+            </a:endParaRPr>
+          </a:p>
+          <a:p>
+            <a:r>
+              <a:rPr lang="en-US" sz="2800" b="1" dirty="0">
+                <a:solidFill>
+                  <a:srgbClr val="FFFFFF"/>
+                </a:solidFill>
+              </a:rPr>
+              <a:t>Click Link</a:t>
+            </a:r>
+            <a:r>
+              <a:rPr lang="en-US" sz="2800" b="1" dirty="0">
+                <a:solidFill>
+                  <a:schemeClr val="accent6"/>
+                </a:solidFill>
+              </a:rPr>
+              <a:t>:</a:t>
+            </a:r>
+          </a:p>
+          <a:p>
+            <a:r>
+              <a:rPr lang="en-US" sz="2800" b="1" dirty="0">
+                <a:solidFill>
+                  <a:schemeClr val="accent6"/>
+                </a:solidFill>
+              </a:rPr>
+              <a:t>1. </a:t>
+            </a:r>
+            <a:r>
+              <a:rPr lang="en-US" sz="2600" b="1" dirty="0">
+                <a:solidFill>
+                  <a:schemeClr val="accent6"/>
+                </a:solidFill>
+              </a:rPr>
+              <a:t>Axes</a:t>
+            </a:r>
           </a:p>
         </p:txBody>
       </p:sp>
+    </p:spTree>
+    <p:extLst>
+      <p:ext uri="{BB962C8B-B14F-4D97-AF65-F5344CB8AC3E}">
+        <p14:creationId xmlns:p14="http://schemas.microsoft.com/office/powerpoint/2010/main" val="3216425423"/>
+      </p:ext>
+    </p:extLst>
+  </p:cSld>
+  <p:clrMapOvr>
+    <a:masterClrMapping/>
+  </p:clrMapOvr>
+</p:sld>
+</file>
+
+<file path=ppt/slides/slide4.xml><?xml version="1.0" encoding="utf-8"?>
+<p:sld xmlns:a="http://schemas.openxmlformats.org/drawingml/2006/main" xmlns:r="http://schemas.openxmlformats.org/officeDocument/2006/relationships" xmlns:p="http://schemas.openxmlformats.org/presentationml/2006/main">
+  <p:cSld>
+    <p:spTree>
+      <p:nvGrpSpPr>
+        <p:cNvPr id="1" name=""/>
+        <p:cNvGrpSpPr/>
+        <p:nvPr/>
+      </p:nvGrpSpPr>
+      <p:grpSpPr>
+        <a:xfrm>
+          <a:off x="0" y="0"/>
+          <a:ext cx="0" cy="0"/>
+          <a:chOff x="0" y="0"/>
+          <a:chExt cx="0" cy="0"/>
+        </a:xfrm>
+      </p:grpSpPr>
       <p:sp>
         <p:nvSpPr>
           <p:cNvPr id="2" name="Title 1">
             <a:extLst>
               <a:ext uri="{FF2B5EF4-FFF2-40B4-BE49-F238E27FC236}">
-                <a16:creationId xmlns:a16="http://schemas.microsoft.com/office/drawing/2014/main" id="{93E65DC6-1C27-1DBC-D764-A0D4B699FB54}"/>
+                <a16:creationId xmlns:a16="http://schemas.microsoft.com/office/drawing/2014/main" id="{70D82EB2-A634-AC14-6086-DD540C674CE9}"/>
               </a:ext>
             </a:extLst>
           </p:cNvPr>
@@ -2510,19 +2599,27 @@
           <a:p>
             <a:r>
               <a:rPr lang="en-US" b="1" dirty="0"/>
-              <a:t>Week 13 </a:t>
+              <a:t>The </a:t>
             </a:r>
             <a:r>
               <a:rPr lang="en-US" b="1" dirty="0">
                 <a:solidFill>
-                  <a:schemeClr val="accent6"/>
-                </a:solidFill>
-              </a:rPr>
-              <a:t>|</a:t>
+                  <a:srgbClr val="00FF00"/>
+                </a:solidFill>
+              </a:rPr>
+              <a:t>csv</a:t>
             </a:r>
             <a:r>
               <a:rPr lang="en-US" b="1" dirty="0"/>
-              <a:t> Exam Review</a:t>
+              <a:t> Module</a:t>
+            </a:r>
+            <a:r>
+              <a:rPr lang="en-US" b="1" dirty="0">
+                <a:solidFill>
+                  <a:srgbClr val="CC99FF"/>
+                </a:solidFill>
+              </a:rPr>
+              <a:t>.</a:t>
             </a:r>
           </a:p>
         </p:txBody>
@@ -2532,7 +2629,7 @@
           <p:cNvPr id="3" name="Content Placeholder 2">
             <a:extLst>
               <a:ext uri="{FF2B5EF4-FFF2-40B4-BE49-F238E27FC236}">
-                <a16:creationId xmlns:a16="http://schemas.microsoft.com/office/drawing/2014/main" id="{2B6F146E-7991-20FF-DF94-2BC46F0677F8}"/>
+                <a16:creationId xmlns:a16="http://schemas.microsoft.com/office/drawing/2014/main" id="{9F383B58-11FE-8CE3-CA97-291A34D394C3}"/>
               </a:ext>
             </a:extLst>
           </p:cNvPr>
@@ -2546,7 +2643,7 @@
         <p:spPr>
           <a:xfrm>
             <a:off x="838200" y="1825624"/>
-            <a:ext cx="4689495" cy="4835479"/>
+            <a:ext cx="6040448" cy="4835479"/>
           </a:xfrm>
         </p:spPr>
         <p:txBody>
@@ -2554,224 +2651,52 @@
           <a:lstStyle/>
           <a:p>
             <a:r>
-              <a:rPr lang="en-US" b="1" dirty="0"/>
-              <a:t>Review 1 </a:t>
-            </a:r>
-            <a:r>
-              <a:rPr lang="en-US" b="1" dirty="0">
-                <a:solidFill>
-                  <a:schemeClr val="accent6"/>
-                </a:solidFill>
-              </a:rPr>
-              <a:t>(</a:t>
-            </a:r>
-            <a:r>
-              <a:rPr lang="en-US" b="1" dirty="0"/>
-              <a:t>Tuesday</a:t>
-            </a:r>
-            <a:r>
-              <a:rPr lang="en-US" b="1" dirty="0">
-                <a:solidFill>
-                  <a:schemeClr val="accent6"/>
-                </a:solidFill>
-              </a:rPr>
-              <a:t>)</a:t>
-            </a:r>
-          </a:p>
-          <a:p>
-            <a:pPr lvl="1"/>
-            <a:r>
               <a:rPr lang="en-US" dirty="0"/>
-              <a:t>Confusing Topics</a:t>
+              <a:t>Remember the csv module from last week</a:t>
             </a:r>
             <a:r>
               <a:rPr lang="en-US" dirty="0">
                 <a:solidFill>
-                  <a:schemeClr val="accent3"/>
+                  <a:srgbClr val="CC99FF"/>
+                </a:solidFill>
+              </a:rPr>
+              <a:t>?</a:t>
+            </a:r>
+          </a:p>
+          <a:p>
+            <a:r>
+              <a:rPr lang="en-US" dirty="0"/>
+              <a:t>Let</a:t>
+            </a:r>
+            <a:r>
+              <a:rPr lang="en-US" dirty="0">
+                <a:solidFill>
+                  <a:srgbClr val="CC99FF"/>
+                </a:solidFill>
+              </a:rPr>
+              <a:t>’</a:t>
+            </a:r>
+            <a:r>
+              <a:rPr lang="en-US" dirty="0"/>
+              <a:t>s see how we can use it to work with a dataset of past presidential elections in the United States</a:t>
+            </a:r>
+            <a:r>
+              <a:rPr lang="en-US" dirty="0">
+                <a:solidFill>
+                  <a:srgbClr val="CC99FF"/>
                 </a:solidFill>
               </a:rPr>
               <a:t>.</a:t>
             </a:r>
-          </a:p>
-          <a:p>
-            <a:r>
-              <a:rPr lang="en-US" b="1" dirty="0"/>
-              <a:t>Review 2 </a:t>
-            </a:r>
-            <a:r>
-              <a:rPr lang="en-US" b="1" dirty="0">
-                <a:solidFill>
-                  <a:schemeClr val="accent6"/>
-                </a:solidFill>
-              </a:rPr>
-              <a:t>(</a:t>
-            </a:r>
-            <a:r>
-              <a:rPr lang="en-US" b="1" dirty="0"/>
-              <a:t>Thursday</a:t>
-            </a:r>
-            <a:r>
-              <a:rPr lang="en-US" b="1" dirty="0">
-                <a:solidFill>
-                  <a:schemeClr val="accent6"/>
-                </a:solidFill>
-              </a:rPr>
-              <a:t>)</a:t>
-            </a:r>
-          </a:p>
-          <a:p>
-            <a:pPr lvl="1"/>
-            <a:r>
-              <a:rPr lang="en-US" dirty="0"/>
-              <a:t>Solving Long</a:t>
-            </a:r>
-            <a:r>
-              <a:rPr lang="en-US" dirty="0">
-                <a:solidFill>
-                  <a:schemeClr val="accent3"/>
-                </a:solidFill>
-              </a:rPr>
-              <a:t>-</a:t>
-            </a:r>
-            <a:r>
-              <a:rPr lang="en-US" dirty="0"/>
-              <a:t>Answer Questions From Past Exams</a:t>
-            </a:r>
-            <a:r>
-              <a:rPr lang="en-US" dirty="0">
-                <a:solidFill>
-                  <a:schemeClr val="accent3"/>
-                </a:solidFill>
-              </a:rPr>
-              <a:t>.</a:t>
-            </a:r>
-          </a:p>
-          <a:p>
-            <a:r>
-              <a:rPr lang="en-US" b="1" dirty="0"/>
-              <a:t>Review 3 </a:t>
-            </a:r>
-            <a:r>
-              <a:rPr lang="en-US" b="1" dirty="0">
-                <a:solidFill>
-                  <a:schemeClr val="accent6"/>
-                </a:solidFill>
-              </a:rPr>
-              <a:t>(</a:t>
-            </a:r>
-            <a:r>
-              <a:rPr lang="en-US" b="1" dirty="0"/>
-              <a:t>Friday</a:t>
-            </a:r>
-            <a:r>
-              <a:rPr lang="en-US" b="1" dirty="0">
-                <a:solidFill>
-                  <a:schemeClr val="accent6"/>
-                </a:solidFill>
-              </a:rPr>
-              <a:t>)</a:t>
-            </a:r>
-          </a:p>
-          <a:p>
-            <a:pPr lvl="1"/>
-            <a:r>
-              <a:rPr lang="en-US" dirty="0"/>
-              <a:t>Jeopardy (Winner Takes All)</a:t>
-            </a:r>
-            <a:r>
-              <a:rPr lang="en-US" dirty="0">
-                <a:solidFill>
-                  <a:schemeClr val="accent3"/>
-                </a:solidFill>
-              </a:rPr>
-              <a:t>.</a:t>
-            </a:r>
-          </a:p>
-          <a:p>
-            <a:pPr lvl="2"/>
-            <a:r>
-              <a:rPr lang="en-US" dirty="0">
-                <a:solidFill>
-                  <a:schemeClr val="accent6"/>
-                </a:solidFill>
-              </a:rPr>
-              <a:t>#</a:t>
-            </a:r>
-            <a:r>
-              <a:rPr lang="en-US" dirty="0"/>
-              <a:t>go</a:t>
-            </a:r>
-            <a:r>
-              <a:rPr lang="en-US" dirty="0">
-                <a:solidFill>
-                  <a:schemeClr val="accent6"/>
-                </a:solidFill>
-              </a:rPr>
-              <a:t>mins</a:t>
-            </a:r>
-            <a:r>
-              <a:rPr lang="en-US" dirty="0"/>
-              <a:t>go</a:t>
-            </a:r>
-          </a:p>
-          <a:p>
-            <a:endParaRPr lang="en-US" dirty="0"/>
           </a:p>
         </p:txBody>
       </p:sp>
-      <p:pic>
-        <p:nvPicPr>
-          <p:cNvPr id="1026" name="Picture 2">
+      <p:sp>
+        <p:nvSpPr>
+          <p:cNvPr id="4" name="Rectangle: Rounded Corners 3">
             <a:extLst>
               <a:ext uri="{FF2B5EF4-FFF2-40B4-BE49-F238E27FC236}">
-                <a16:creationId xmlns:a16="http://schemas.microsoft.com/office/drawing/2014/main" id="{4FC5DAC3-3A52-392D-C104-62FDF5805808}"/>
-              </a:ext>
-            </a:extLst>
-          </p:cNvPr>
-          <p:cNvPicPr>
-            <a:picLocks noChangeAspect="1" noChangeArrowheads="1"/>
-          </p:cNvPicPr>
-          <p:nvPr/>
-        </p:nvPicPr>
-        <p:blipFill>
-          <a:blip r:embed="rId2">
-            <a:extLst>
-              <a:ext uri="{28A0092B-C50C-407E-A947-70E740481C1C}">
-                <a14:useLocalDpi xmlns:a14="http://schemas.microsoft.com/office/drawing/2010/main" val="0"/>
-              </a:ext>
-            </a:extLst>
-          </a:blip>
-          <a:srcRect/>
-          <a:stretch>
-            <a:fillRect/>
-          </a:stretch>
-        </p:blipFill>
-        <p:spPr bwMode="auto">
-          <a:xfrm>
-            <a:off x="7461946" y="1193390"/>
-            <a:ext cx="4471219" cy="4471219"/>
-          </a:xfrm>
-          <a:prstGeom prst="rect">
-            <a:avLst/>
-          </a:prstGeom>
-          <a:noFill/>
-          <a:extLst>
-            <a:ext uri="{909E8E84-426E-40DD-AFC4-6F175D3DCCD1}">
-              <a14:hiddenFill xmlns:a14="http://schemas.microsoft.com/office/drawing/2010/main">
-                <a:solidFill>
-                  <a:srgbClr val="FFFFFF"/>
-                </a:solidFill>
-              </a14:hiddenFill>
-            </a:ext>
-          </a:extLst>
-        </p:spPr>
-      </p:pic>
-      <p:sp>
-        <p:nvSpPr>
-          <p:cNvPr id="5" name="Rectangle 4">
-            <a:extLst>
-              <a:ext uri="{FF2B5EF4-FFF2-40B4-BE49-F238E27FC236}">
-                <a16:creationId xmlns:a16="http://schemas.microsoft.com/office/drawing/2014/main" id="{D3EB6927-139B-41AC-6CC0-7836D6D0A3E9}"/>
+                <a16:creationId xmlns:a16="http://schemas.microsoft.com/office/drawing/2014/main" id="{29AC7AAD-8AA0-8DEE-049C-0F4CC8EFC45F}"/>
               </a:ext>
             </a:extLst>
           </p:cNvPr>
@@ -2780,17 +2705,17 @@
         </p:nvSpPr>
         <p:spPr>
           <a:xfrm>
-            <a:off x="7120028" y="365760"/>
-            <a:ext cx="166165" cy="6427348"/>
+            <a:off x="7844590" y="1949006"/>
+            <a:ext cx="3958389" cy="4418765"/>
           </a:xfrm>
-          <a:prstGeom prst="rect">
+          <a:prstGeom prst="roundRect">
             <a:avLst/>
           </a:prstGeom>
-          <a:solidFill>
-            <a:srgbClr val="444445"/>
-          </a:solidFill>
-          <a:ln>
-            <a:noFill/>
+          <a:noFill/>
+          <a:ln w="76200">
+            <a:solidFill>
+              <a:schemeClr val="accent2"/>
+            </a:solidFill>
           </a:ln>
         </p:spPr>
         <p:style>
@@ -2813,46 +2738,56 @@
           <a:bodyPr rtlCol="0" anchor="ctr"/>
           <a:lstStyle/>
           <a:p>
-            <a:pPr algn="ctr"/>
-            <a:endParaRPr lang="en-US"/>
-          </a:p>
-        </p:txBody>
-      </p:sp>
-      <p:sp>
-        <p:nvSpPr>
-          <p:cNvPr id="6" name="TextBox 5">
-            <a:extLst>
-              <a:ext uri="{FF2B5EF4-FFF2-40B4-BE49-F238E27FC236}">
-                <a16:creationId xmlns:a16="http://schemas.microsoft.com/office/drawing/2014/main" id="{5CB73A00-96C2-5238-3525-FA48A7320DD9}"/>
-              </a:ext>
-            </a:extLst>
-          </p:cNvPr>
-          <p:cNvSpPr txBox="1"/>
-          <p:nvPr/>
-        </p:nvSpPr>
-        <p:spPr>
-          <a:xfrm>
-            <a:off x="7523530" y="870922"/>
-            <a:ext cx="4348050" cy="369332"/>
-          </a:xfrm>
-          <a:prstGeom prst="rect">
-            <a:avLst/>
-          </a:prstGeom>
-          <a:noFill/>
-        </p:spPr>
-        <p:txBody>
-          <a:bodyPr wrap="none" rtlCol="0">
-            <a:spAutoFit/>
-          </a:bodyPr>
-          <a:lstStyle/>
-          <a:p>
-            <a:r>
-              <a:rPr lang="en-US" b="1" dirty="0">
-                <a:solidFill>
-                  <a:srgbClr val="FF5050"/>
-                </a:solidFill>
-              </a:rPr>
-              <a:t>https://www.menti.com/blab1hazqqzt</a:t>
+            <a:r>
+              <a:rPr lang="en-US" sz="4400" b="1" dirty="0">
+                <a:solidFill>
+                  <a:srgbClr val="FFFFFF"/>
+                </a:solidFill>
+              </a:rPr>
+              <a:t>Open your notebook</a:t>
+            </a:r>
+          </a:p>
+          <a:p>
+            <a:endParaRPr lang="en-US" sz="4400" b="1" dirty="0">
+              <a:solidFill>
+                <a:srgbClr val="FFFFFF"/>
+              </a:solidFill>
+            </a:endParaRPr>
+          </a:p>
+          <a:p>
+            <a:r>
+              <a:rPr lang="en-US" sz="2800" b="1" dirty="0">
+                <a:solidFill>
+                  <a:srgbClr val="FFFFFF"/>
+                </a:solidFill>
+              </a:rPr>
+              <a:t>Click Link</a:t>
+            </a:r>
+            <a:r>
+              <a:rPr lang="en-US" sz="2800" b="1" dirty="0">
+                <a:solidFill>
+                  <a:schemeClr val="accent6"/>
+                </a:solidFill>
+              </a:rPr>
+              <a:t>:</a:t>
+            </a:r>
+          </a:p>
+          <a:p>
+            <a:r>
+              <a:rPr lang="en-US" sz="2800" b="1" dirty="0">
+                <a:solidFill>
+                  <a:schemeClr val="accent6"/>
+                </a:solidFill>
+              </a:rPr>
+              <a:t>2. </a:t>
+            </a:r>
+            <a:r>
+              <a:rPr lang="en-US" sz="2600" b="1" dirty="0">
+                <a:solidFill>
+                  <a:schemeClr val="accent6"/>
+                </a:solidFill>
+              </a:rPr>
+              <a:t>Utility Methods</a:t>
             </a:r>
           </a:p>
         </p:txBody>
@@ -2860,7 +2795,7 @@
     </p:spTree>
     <p:extLst>
       <p:ext uri="{BB962C8B-B14F-4D97-AF65-F5344CB8AC3E}">
-        <p14:creationId xmlns:p14="http://schemas.microsoft.com/office/powerpoint/2010/main" val="2352292036"/>
+        <p14:creationId xmlns:p14="http://schemas.microsoft.com/office/powerpoint/2010/main" val="2606121415"/>
       </p:ext>
     </p:extLst>
   </p:cSld>
@@ -2870,7 +2805,999 @@
 </p:sld>
 </file>
 
-<file path=ppt/slides/slide4.xml><?xml version="1.0" encoding="utf-8"?>
+<file path=ppt/slides/slide5.xml><?xml version="1.0" encoding="utf-8"?>
+<p:sld xmlns:a="http://schemas.openxmlformats.org/drawingml/2006/main" xmlns:r="http://schemas.openxmlformats.org/officeDocument/2006/relationships" xmlns:p="http://schemas.openxmlformats.org/presentationml/2006/main">
+  <p:cSld>
+    <p:spTree>
+      <p:nvGrpSpPr>
+        <p:cNvPr id="1" name=""/>
+        <p:cNvGrpSpPr/>
+        <p:nvPr/>
+      </p:nvGrpSpPr>
+      <p:grpSpPr>
+        <a:xfrm>
+          <a:off x="0" y="0"/>
+          <a:ext cx="0" cy="0"/>
+          <a:chOff x="0" y="0"/>
+          <a:chExt cx="0" cy="0"/>
+        </a:xfrm>
+      </p:grpSpPr>
+      <p:sp>
+        <p:nvSpPr>
+          <p:cNvPr id="2" name="Title 1">
+            <a:extLst>
+              <a:ext uri="{FF2B5EF4-FFF2-40B4-BE49-F238E27FC236}">
+                <a16:creationId xmlns:a16="http://schemas.microsoft.com/office/drawing/2014/main" id="{70D82EB2-A634-AC14-6086-DD540C674CE9}"/>
+              </a:ext>
+            </a:extLst>
+          </p:cNvPr>
+          <p:cNvSpPr>
+            <a:spLocks noGrp="1"/>
+          </p:cNvSpPr>
+          <p:nvPr>
+            <p:ph type="title"/>
+          </p:nvPr>
+        </p:nvSpPr>
+        <p:spPr/>
+        <p:txBody>
+          <a:bodyPr>
+            <a:normAutofit fontScale="90000"/>
+          </a:bodyPr>
+          <a:lstStyle/>
+          <a:p>
+            <a:r>
+              <a:rPr lang="en-US" b="1" dirty="0"/>
+              <a:t>The </a:t>
+            </a:r>
+            <a:r>
+              <a:rPr lang="en-US" b="1" dirty="0">
+                <a:solidFill>
+                  <a:srgbClr val="00FF00"/>
+                </a:solidFill>
+              </a:rPr>
+              <a:t>csv</a:t>
+            </a:r>
+            <a:r>
+              <a:rPr lang="en-US" b="1" dirty="0"/>
+              <a:t> Module</a:t>
+            </a:r>
+            <a:r>
+              <a:rPr lang="en-US" b="1" dirty="0">
+                <a:solidFill>
+                  <a:srgbClr val="CC99FF"/>
+                </a:solidFill>
+              </a:rPr>
+              <a:t>.</a:t>
+            </a:r>
+          </a:p>
+        </p:txBody>
+      </p:sp>
+      <p:sp>
+        <p:nvSpPr>
+          <p:cNvPr id="3" name="Content Placeholder 2">
+            <a:extLst>
+              <a:ext uri="{FF2B5EF4-FFF2-40B4-BE49-F238E27FC236}">
+                <a16:creationId xmlns:a16="http://schemas.microsoft.com/office/drawing/2014/main" id="{9F383B58-11FE-8CE3-CA97-291A34D394C3}"/>
+              </a:ext>
+            </a:extLst>
+          </p:cNvPr>
+          <p:cNvSpPr>
+            <a:spLocks noGrp="1"/>
+          </p:cNvSpPr>
+          <p:nvPr>
+            <p:ph idx="1"/>
+          </p:nvPr>
+        </p:nvSpPr>
+        <p:spPr>
+          <a:xfrm>
+            <a:off x="838200" y="1825624"/>
+            <a:ext cx="6040448" cy="4835479"/>
+          </a:xfrm>
+        </p:spPr>
+        <p:txBody>
+          <a:bodyPr/>
+          <a:lstStyle/>
+          <a:p>
+            <a:r>
+              <a:rPr lang="en-US" dirty="0"/>
+              <a:t>Remember the csv module from last week</a:t>
+            </a:r>
+            <a:r>
+              <a:rPr lang="en-US" dirty="0">
+                <a:solidFill>
+                  <a:srgbClr val="CC99FF"/>
+                </a:solidFill>
+              </a:rPr>
+              <a:t>?</a:t>
+            </a:r>
+          </a:p>
+          <a:p>
+            <a:r>
+              <a:rPr lang="en-US" dirty="0"/>
+              <a:t>Let</a:t>
+            </a:r>
+            <a:r>
+              <a:rPr lang="en-US" dirty="0">
+                <a:solidFill>
+                  <a:srgbClr val="CC99FF"/>
+                </a:solidFill>
+              </a:rPr>
+              <a:t>’</a:t>
+            </a:r>
+            <a:r>
+              <a:rPr lang="en-US" dirty="0"/>
+              <a:t>s see how we can use it to work with a dataset of past presidential elections in the United States</a:t>
+            </a:r>
+            <a:r>
+              <a:rPr lang="en-US" dirty="0">
+                <a:solidFill>
+                  <a:srgbClr val="CC99FF"/>
+                </a:solidFill>
+              </a:rPr>
+              <a:t>.</a:t>
+            </a:r>
+          </a:p>
+        </p:txBody>
+      </p:sp>
+      <p:sp>
+        <p:nvSpPr>
+          <p:cNvPr id="4" name="Rectangle: Rounded Corners 3">
+            <a:extLst>
+              <a:ext uri="{FF2B5EF4-FFF2-40B4-BE49-F238E27FC236}">
+                <a16:creationId xmlns:a16="http://schemas.microsoft.com/office/drawing/2014/main" id="{29AC7AAD-8AA0-8DEE-049C-0F4CC8EFC45F}"/>
+              </a:ext>
+            </a:extLst>
+          </p:cNvPr>
+          <p:cNvSpPr/>
+          <p:nvPr/>
+        </p:nvSpPr>
+        <p:spPr>
+          <a:xfrm>
+            <a:off x="7844590" y="1949006"/>
+            <a:ext cx="3958389" cy="4418765"/>
+          </a:xfrm>
+          <a:prstGeom prst="roundRect">
+            <a:avLst/>
+          </a:prstGeom>
+          <a:noFill/>
+          <a:ln w="76200">
+            <a:solidFill>
+              <a:schemeClr val="accent2"/>
+            </a:solidFill>
+          </a:ln>
+        </p:spPr>
+        <p:style>
+          <a:lnRef idx="2">
+            <a:schemeClr val="accent1">
+              <a:shade val="50000"/>
+            </a:schemeClr>
+          </a:lnRef>
+          <a:fillRef idx="1">
+            <a:schemeClr val="accent1"/>
+          </a:fillRef>
+          <a:effectRef idx="0">
+            <a:schemeClr val="accent1"/>
+          </a:effectRef>
+          <a:fontRef idx="minor">
+            <a:schemeClr val="lt1"/>
+          </a:fontRef>
+        </p:style>
+        <p:txBody>
+          <a:bodyPr rtlCol="0" anchor="ctr"/>
+          <a:lstStyle/>
+          <a:p>
+            <a:r>
+              <a:rPr lang="en-US" sz="4400" b="1" dirty="0">
+                <a:solidFill>
+                  <a:srgbClr val="FFFFFF"/>
+                </a:solidFill>
+              </a:rPr>
+              <a:t>Open your notebook</a:t>
+            </a:r>
+          </a:p>
+          <a:p>
+            <a:endParaRPr lang="en-US" sz="4400" b="1" dirty="0">
+              <a:solidFill>
+                <a:srgbClr val="FFFFFF"/>
+              </a:solidFill>
+            </a:endParaRPr>
+          </a:p>
+          <a:p>
+            <a:r>
+              <a:rPr lang="en-US" sz="2800" b="1" dirty="0">
+                <a:solidFill>
+                  <a:srgbClr val="FFFFFF"/>
+                </a:solidFill>
+              </a:rPr>
+              <a:t>Click Link</a:t>
+            </a:r>
+            <a:r>
+              <a:rPr lang="en-US" sz="2800" b="1" dirty="0">
+                <a:solidFill>
+                  <a:schemeClr val="accent6"/>
+                </a:solidFill>
+              </a:rPr>
+              <a:t>:</a:t>
+            </a:r>
+          </a:p>
+          <a:p>
+            <a:r>
+              <a:rPr lang="en-US" sz="2800" b="1" dirty="0">
+                <a:solidFill>
+                  <a:schemeClr val="accent6"/>
+                </a:solidFill>
+              </a:rPr>
+              <a:t>2. </a:t>
+            </a:r>
+            <a:r>
+              <a:rPr lang="en-US" sz="2600" b="1" dirty="0">
+                <a:solidFill>
+                  <a:schemeClr val="accent6"/>
+                </a:solidFill>
+              </a:rPr>
+              <a:t>Conditional Selection</a:t>
+            </a:r>
+          </a:p>
+        </p:txBody>
+      </p:sp>
+    </p:spTree>
+    <p:extLst>
+      <p:ext uri="{BB962C8B-B14F-4D97-AF65-F5344CB8AC3E}">
+        <p14:creationId xmlns:p14="http://schemas.microsoft.com/office/powerpoint/2010/main" val="1050008763"/>
+      </p:ext>
+    </p:extLst>
+  </p:cSld>
+  <p:clrMapOvr>
+    <a:masterClrMapping/>
+  </p:clrMapOvr>
+</p:sld>
+</file>
+
+<file path=ppt/slides/slide6.xml><?xml version="1.0" encoding="utf-8"?>
+<p:sld xmlns:a="http://schemas.openxmlformats.org/drawingml/2006/main" xmlns:r="http://schemas.openxmlformats.org/officeDocument/2006/relationships" xmlns:p="http://schemas.openxmlformats.org/presentationml/2006/main">
+  <p:cSld>
+    <p:spTree>
+      <p:nvGrpSpPr>
+        <p:cNvPr id="1" name=""/>
+        <p:cNvGrpSpPr/>
+        <p:nvPr/>
+      </p:nvGrpSpPr>
+      <p:grpSpPr>
+        <a:xfrm>
+          <a:off x="0" y="0"/>
+          <a:ext cx="0" cy="0"/>
+          <a:chOff x="0" y="0"/>
+          <a:chExt cx="0" cy="0"/>
+        </a:xfrm>
+      </p:grpSpPr>
+      <p:sp>
+        <p:nvSpPr>
+          <p:cNvPr id="2" name="Title 1">
+            <a:extLst>
+              <a:ext uri="{FF2B5EF4-FFF2-40B4-BE49-F238E27FC236}">
+                <a16:creationId xmlns:a16="http://schemas.microsoft.com/office/drawing/2014/main" id="{70D82EB2-A634-AC14-6086-DD540C674CE9}"/>
+              </a:ext>
+            </a:extLst>
+          </p:cNvPr>
+          <p:cNvSpPr>
+            <a:spLocks noGrp="1"/>
+          </p:cNvSpPr>
+          <p:nvPr>
+            <p:ph type="title"/>
+          </p:nvPr>
+        </p:nvSpPr>
+        <p:spPr/>
+        <p:txBody>
+          <a:bodyPr>
+            <a:normAutofit fontScale="90000"/>
+          </a:bodyPr>
+          <a:lstStyle/>
+          <a:p>
+            <a:r>
+              <a:rPr lang="en-US" b="1" dirty="0"/>
+              <a:t>The </a:t>
+            </a:r>
+            <a:r>
+              <a:rPr lang="en-US" b="1" dirty="0">
+                <a:solidFill>
+                  <a:srgbClr val="00FF00"/>
+                </a:solidFill>
+              </a:rPr>
+              <a:t>csv</a:t>
+            </a:r>
+            <a:r>
+              <a:rPr lang="en-US" b="1" dirty="0"/>
+              <a:t> Module</a:t>
+            </a:r>
+            <a:r>
+              <a:rPr lang="en-US" b="1" dirty="0">
+                <a:solidFill>
+                  <a:srgbClr val="CC99FF"/>
+                </a:solidFill>
+              </a:rPr>
+              <a:t>.</a:t>
+            </a:r>
+          </a:p>
+        </p:txBody>
+      </p:sp>
+      <p:sp>
+        <p:nvSpPr>
+          <p:cNvPr id="3" name="Content Placeholder 2">
+            <a:extLst>
+              <a:ext uri="{FF2B5EF4-FFF2-40B4-BE49-F238E27FC236}">
+                <a16:creationId xmlns:a16="http://schemas.microsoft.com/office/drawing/2014/main" id="{9F383B58-11FE-8CE3-CA97-291A34D394C3}"/>
+              </a:ext>
+            </a:extLst>
+          </p:cNvPr>
+          <p:cNvSpPr>
+            <a:spLocks noGrp="1"/>
+          </p:cNvSpPr>
+          <p:nvPr>
+            <p:ph idx="1"/>
+          </p:nvPr>
+        </p:nvSpPr>
+        <p:spPr>
+          <a:xfrm>
+            <a:off x="838200" y="1825624"/>
+            <a:ext cx="6040448" cy="4835479"/>
+          </a:xfrm>
+        </p:spPr>
+        <p:txBody>
+          <a:bodyPr/>
+          <a:lstStyle/>
+          <a:p>
+            <a:r>
+              <a:rPr lang="en-US" dirty="0"/>
+              <a:t>Remember the csv module from last week</a:t>
+            </a:r>
+            <a:r>
+              <a:rPr lang="en-US" dirty="0">
+                <a:solidFill>
+                  <a:srgbClr val="CC99FF"/>
+                </a:solidFill>
+              </a:rPr>
+              <a:t>?</a:t>
+            </a:r>
+          </a:p>
+          <a:p>
+            <a:r>
+              <a:rPr lang="en-US" dirty="0"/>
+              <a:t>Let</a:t>
+            </a:r>
+            <a:r>
+              <a:rPr lang="en-US" dirty="0">
+                <a:solidFill>
+                  <a:srgbClr val="CC99FF"/>
+                </a:solidFill>
+              </a:rPr>
+              <a:t>’</a:t>
+            </a:r>
+            <a:r>
+              <a:rPr lang="en-US" dirty="0"/>
+              <a:t>s see how we can use it to work with a dataset of past presidential elections in the United States</a:t>
+            </a:r>
+            <a:r>
+              <a:rPr lang="en-US" dirty="0">
+                <a:solidFill>
+                  <a:srgbClr val="CC99FF"/>
+                </a:solidFill>
+              </a:rPr>
+              <a:t>.</a:t>
+            </a:r>
+          </a:p>
+        </p:txBody>
+      </p:sp>
+      <p:sp>
+        <p:nvSpPr>
+          <p:cNvPr id="4" name="Rectangle: Rounded Corners 3">
+            <a:extLst>
+              <a:ext uri="{FF2B5EF4-FFF2-40B4-BE49-F238E27FC236}">
+                <a16:creationId xmlns:a16="http://schemas.microsoft.com/office/drawing/2014/main" id="{29AC7AAD-8AA0-8DEE-049C-0F4CC8EFC45F}"/>
+              </a:ext>
+            </a:extLst>
+          </p:cNvPr>
+          <p:cNvSpPr/>
+          <p:nvPr/>
+        </p:nvSpPr>
+        <p:spPr>
+          <a:xfrm>
+            <a:off x="7844590" y="1949006"/>
+            <a:ext cx="3958389" cy="4418765"/>
+          </a:xfrm>
+          <a:prstGeom prst="roundRect">
+            <a:avLst/>
+          </a:prstGeom>
+          <a:noFill/>
+          <a:ln w="76200">
+            <a:solidFill>
+              <a:schemeClr val="accent2"/>
+            </a:solidFill>
+          </a:ln>
+        </p:spPr>
+        <p:style>
+          <a:lnRef idx="2">
+            <a:schemeClr val="accent1">
+              <a:shade val="50000"/>
+            </a:schemeClr>
+          </a:lnRef>
+          <a:fillRef idx="1">
+            <a:schemeClr val="accent1"/>
+          </a:fillRef>
+          <a:effectRef idx="0">
+            <a:schemeClr val="accent1"/>
+          </a:effectRef>
+          <a:fontRef idx="minor">
+            <a:schemeClr val="lt1"/>
+          </a:fontRef>
+        </p:style>
+        <p:txBody>
+          <a:bodyPr rtlCol="0" anchor="ctr"/>
+          <a:lstStyle/>
+          <a:p>
+            <a:r>
+              <a:rPr lang="en-US" sz="4400" b="1" dirty="0">
+                <a:solidFill>
+                  <a:srgbClr val="FFFFFF"/>
+                </a:solidFill>
+              </a:rPr>
+              <a:t>Open your notebook</a:t>
+            </a:r>
+          </a:p>
+          <a:p>
+            <a:endParaRPr lang="en-US" sz="4400" b="1" dirty="0">
+              <a:solidFill>
+                <a:srgbClr val="FFFFFF"/>
+              </a:solidFill>
+            </a:endParaRPr>
+          </a:p>
+          <a:p>
+            <a:r>
+              <a:rPr lang="en-US" sz="2800" b="1" dirty="0">
+                <a:solidFill>
+                  <a:srgbClr val="FFFFFF"/>
+                </a:solidFill>
+              </a:rPr>
+              <a:t>Click Link</a:t>
+            </a:r>
+            <a:r>
+              <a:rPr lang="en-US" sz="2800" b="1" dirty="0">
+                <a:solidFill>
+                  <a:schemeClr val="accent6"/>
+                </a:solidFill>
+              </a:rPr>
+              <a:t>:</a:t>
+            </a:r>
+          </a:p>
+          <a:p>
+            <a:r>
+              <a:rPr lang="en-US" sz="2800" b="1" dirty="0">
+                <a:solidFill>
+                  <a:schemeClr val="accent6"/>
+                </a:solidFill>
+              </a:rPr>
+              <a:t>2. </a:t>
+            </a:r>
+            <a:r>
+              <a:rPr lang="en-US" sz="2600" b="1" dirty="0">
+                <a:solidFill>
+                  <a:schemeClr val="accent6"/>
+                </a:solidFill>
+              </a:rPr>
+              <a:t>Concatenation</a:t>
+            </a:r>
+          </a:p>
+        </p:txBody>
+      </p:sp>
+    </p:spTree>
+    <p:extLst>
+      <p:ext uri="{BB962C8B-B14F-4D97-AF65-F5344CB8AC3E}">
+        <p14:creationId xmlns:p14="http://schemas.microsoft.com/office/powerpoint/2010/main" val="3066397665"/>
+      </p:ext>
+    </p:extLst>
+  </p:cSld>
+  <p:clrMapOvr>
+    <a:masterClrMapping/>
+  </p:clrMapOvr>
+</p:sld>
+</file>
+
+<file path=ppt/slides/slide7.xml><?xml version="1.0" encoding="utf-8"?>
+<p:sld xmlns:a="http://schemas.openxmlformats.org/drawingml/2006/main" xmlns:r="http://schemas.openxmlformats.org/officeDocument/2006/relationships" xmlns:p="http://schemas.openxmlformats.org/presentationml/2006/main">
+  <p:cSld>
+    <p:spTree>
+      <p:nvGrpSpPr>
+        <p:cNvPr id="1" name=""/>
+        <p:cNvGrpSpPr/>
+        <p:nvPr/>
+      </p:nvGrpSpPr>
+      <p:grpSpPr>
+        <a:xfrm>
+          <a:off x="0" y="0"/>
+          <a:ext cx="0" cy="0"/>
+          <a:chOff x="0" y="0"/>
+          <a:chExt cx="0" cy="0"/>
+        </a:xfrm>
+      </p:grpSpPr>
+      <p:sp>
+        <p:nvSpPr>
+          <p:cNvPr id="2" name="Title 1">
+            <a:extLst>
+              <a:ext uri="{FF2B5EF4-FFF2-40B4-BE49-F238E27FC236}">
+                <a16:creationId xmlns:a16="http://schemas.microsoft.com/office/drawing/2014/main" id="{70D82EB2-A634-AC14-6086-DD540C674CE9}"/>
+              </a:ext>
+            </a:extLst>
+          </p:cNvPr>
+          <p:cNvSpPr>
+            <a:spLocks noGrp="1"/>
+          </p:cNvSpPr>
+          <p:nvPr>
+            <p:ph type="title"/>
+          </p:nvPr>
+        </p:nvSpPr>
+        <p:spPr/>
+        <p:txBody>
+          <a:bodyPr>
+            <a:normAutofit fontScale="90000"/>
+          </a:bodyPr>
+          <a:lstStyle/>
+          <a:p>
+            <a:r>
+              <a:rPr lang="en-US" b="1" dirty="0"/>
+              <a:t>The </a:t>
+            </a:r>
+            <a:r>
+              <a:rPr lang="en-US" b="1" dirty="0">
+                <a:solidFill>
+                  <a:srgbClr val="00FF00"/>
+                </a:solidFill>
+              </a:rPr>
+              <a:t>csv</a:t>
+            </a:r>
+            <a:r>
+              <a:rPr lang="en-US" b="1" dirty="0"/>
+              <a:t> Module</a:t>
+            </a:r>
+            <a:r>
+              <a:rPr lang="en-US" b="1" dirty="0">
+                <a:solidFill>
+                  <a:srgbClr val="CC99FF"/>
+                </a:solidFill>
+              </a:rPr>
+              <a:t>.</a:t>
+            </a:r>
+          </a:p>
+        </p:txBody>
+      </p:sp>
+      <p:sp>
+        <p:nvSpPr>
+          <p:cNvPr id="3" name="Content Placeholder 2">
+            <a:extLst>
+              <a:ext uri="{FF2B5EF4-FFF2-40B4-BE49-F238E27FC236}">
+                <a16:creationId xmlns:a16="http://schemas.microsoft.com/office/drawing/2014/main" id="{9F383B58-11FE-8CE3-CA97-291A34D394C3}"/>
+              </a:ext>
+            </a:extLst>
+          </p:cNvPr>
+          <p:cNvSpPr>
+            <a:spLocks noGrp="1"/>
+          </p:cNvSpPr>
+          <p:nvPr>
+            <p:ph idx="1"/>
+          </p:nvPr>
+        </p:nvSpPr>
+        <p:spPr>
+          <a:xfrm>
+            <a:off x="838200" y="1825624"/>
+            <a:ext cx="6040448" cy="4835479"/>
+          </a:xfrm>
+        </p:spPr>
+        <p:txBody>
+          <a:bodyPr/>
+          <a:lstStyle/>
+          <a:p>
+            <a:r>
+              <a:rPr lang="en-US" dirty="0"/>
+              <a:t>Remember the csv module from last week</a:t>
+            </a:r>
+            <a:r>
+              <a:rPr lang="en-US" dirty="0">
+                <a:solidFill>
+                  <a:srgbClr val="CC99FF"/>
+                </a:solidFill>
+              </a:rPr>
+              <a:t>?</a:t>
+            </a:r>
+          </a:p>
+          <a:p>
+            <a:r>
+              <a:rPr lang="en-US" dirty="0"/>
+              <a:t>Let</a:t>
+            </a:r>
+            <a:r>
+              <a:rPr lang="en-US" dirty="0">
+                <a:solidFill>
+                  <a:srgbClr val="CC99FF"/>
+                </a:solidFill>
+              </a:rPr>
+              <a:t>’</a:t>
+            </a:r>
+            <a:r>
+              <a:rPr lang="en-US" dirty="0"/>
+              <a:t>s see how we can use it to work with a dataset of past presidential elections in the United States</a:t>
+            </a:r>
+            <a:r>
+              <a:rPr lang="en-US" dirty="0">
+                <a:solidFill>
+                  <a:srgbClr val="CC99FF"/>
+                </a:solidFill>
+              </a:rPr>
+              <a:t>.</a:t>
+            </a:r>
+          </a:p>
+        </p:txBody>
+      </p:sp>
+      <p:sp>
+        <p:nvSpPr>
+          <p:cNvPr id="4" name="Rectangle: Rounded Corners 3">
+            <a:extLst>
+              <a:ext uri="{FF2B5EF4-FFF2-40B4-BE49-F238E27FC236}">
+                <a16:creationId xmlns:a16="http://schemas.microsoft.com/office/drawing/2014/main" id="{29AC7AAD-8AA0-8DEE-049C-0F4CC8EFC45F}"/>
+              </a:ext>
+            </a:extLst>
+          </p:cNvPr>
+          <p:cNvSpPr/>
+          <p:nvPr/>
+        </p:nvSpPr>
+        <p:spPr>
+          <a:xfrm>
+            <a:off x="7844590" y="1949006"/>
+            <a:ext cx="3958389" cy="4418765"/>
+          </a:xfrm>
+          <a:prstGeom prst="roundRect">
+            <a:avLst/>
+          </a:prstGeom>
+          <a:noFill/>
+          <a:ln w="76200">
+            <a:solidFill>
+              <a:schemeClr val="accent2"/>
+            </a:solidFill>
+          </a:ln>
+        </p:spPr>
+        <p:style>
+          <a:lnRef idx="2">
+            <a:schemeClr val="accent1">
+              <a:shade val="50000"/>
+            </a:schemeClr>
+          </a:lnRef>
+          <a:fillRef idx="1">
+            <a:schemeClr val="accent1"/>
+          </a:fillRef>
+          <a:effectRef idx="0">
+            <a:schemeClr val="accent1"/>
+          </a:effectRef>
+          <a:fontRef idx="minor">
+            <a:schemeClr val="lt1"/>
+          </a:fontRef>
+        </p:style>
+        <p:txBody>
+          <a:bodyPr rtlCol="0" anchor="ctr"/>
+          <a:lstStyle/>
+          <a:p>
+            <a:r>
+              <a:rPr lang="en-US" sz="4400" b="1" dirty="0">
+                <a:solidFill>
+                  <a:srgbClr val="FFFFFF"/>
+                </a:solidFill>
+              </a:rPr>
+              <a:t>Open your notebook</a:t>
+            </a:r>
+          </a:p>
+          <a:p>
+            <a:endParaRPr lang="en-US" sz="4400" b="1" dirty="0">
+              <a:solidFill>
+                <a:srgbClr val="FFFFFF"/>
+              </a:solidFill>
+            </a:endParaRPr>
+          </a:p>
+          <a:p>
+            <a:r>
+              <a:rPr lang="en-US" sz="2800" b="1" dirty="0">
+                <a:solidFill>
+                  <a:srgbClr val="FFFFFF"/>
+                </a:solidFill>
+              </a:rPr>
+              <a:t>Click Link</a:t>
+            </a:r>
+            <a:r>
+              <a:rPr lang="en-US" sz="2800" b="1" dirty="0">
+                <a:solidFill>
+                  <a:schemeClr val="accent6"/>
+                </a:solidFill>
+              </a:rPr>
+              <a:t>:</a:t>
+            </a:r>
+          </a:p>
+          <a:p>
+            <a:r>
+              <a:rPr lang="en-US" sz="2800" b="1" dirty="0">
+                <a:solidFill>
+                  <a:schemeClr val="accent6"/>
+                </a:solidFill>
+              </a:rPr>
+              <a:t>2. </a:t>
+            </a:r>
+            <a:r>
+              <a:rPr lang="en-US" sz="2600" b="1" dirty="0">
+                <a:solidFill>
+                  <a:schemeClr val="accent6"/>
+                </a:solidFill>
+              </a:rPr>
+              <a:t>Grouping</a:t>
+            </a:r>
+          </a:p>
+        </p:txBody>
+      </p:sp>
+    </p:spTree>
+    <p:extLst>
+      <p:ext uri="{BB962C8B-B14F-4D97-AF65-F5344CB8AC3E}">
+        <p14:creationId xmlns:p14="http://schemas.microsoft.com/office/powerpoint/2010/main" val="1025644677"/>
+      </p:ext>
+    </p:extLst>
+  </p:cSld>
+  <p:clrMapOvr>
+    <a:masterClrMapping/>
+  </p:clrMapOvr>
+</p:sld>
+</file>
+
+<file path=ppt/slides/slide8.xml><?xml version="1.0" encoding="utf-8"?>
+<p:sld xmlns:a="http://schemas.openxmlformats.org/drawingml/2006/main" xmlns:r="http://schemas.openxmlformats.org/officeDocument/2006/relationships" xmlns:p="http://schemas.openxmlformats.org/presentationml/2006/main">
+  <p:cSld>
+    <p:spTree>
+      <p:nvGrpSpPr>
+        <p:cNvPr id="1" name=""/>
+        <p:cNvGrpSpPr/>
+        <p:nvPr/>
+      </p:nvGrpSpPr>
+      <p:grpSpPr>
+        <a:xfrm>
+          <a:off x="0" y="0"/>
+          <a:ext cx="0" cy="0"/>
+          <a:chOff x="0" y="0"/>
+          <a:chExt cx="0" cy="0"/>
+        </a:xfrm>
+      </p:grpSpPr>
+      <p:sp>
+        <p:nvSpPr>
+          <p:cNvPr id="2" name="Title 1">
+            <a:extLst>
+              <a:ext uri="{FF2B5EF4-FFF2-40B4-BE49-F238E27FC236}">
+                <a16:creationId xmlns:a16="http://schemas.microsoft.com/office/drawing/2014/main" id="{70D82EB2-A634-AC14-6086-DD540C674CE9}"/>
+              </a:ext>
+            </a:extLst>
+          </p:cNvPr>
+          <p:cNvSpPr>
+            <a:spLocks noGrp="1"/>
+          </p:cNvSpPr>
+          <p:nvPr>
+            <p:ph type="title"/>
+          </p:nvPr>
+        </p:nvSpPr>
+        <p:spPr/>
+        <p:txBody>
+          <a:bodyPr>
+            <a:normAutofit fontScale="90000"/>
+          </a:bodyPr>
+          <a:lstStyle/>
+          <a:p>
+            <a:r>
+              <a:rPr lang="en-US" b="1" dirty="0"/>
+              <a:t>The </a:t>
+            </a:r>
+            <a:r>
+              <a:rPr lang="en-US" b="1" dirty="0">
+                <a:solidFill>
+                  <a:srgbClr val="00FF00"/>
+                </a:solidFill>
+              </a:rPr>
+              <a:t>csv</a:t>
+            </a:r>
+            <a:r>
+              <a:rPr lang="en-US" b="1" dirty="0"/>
+              <a:t> Module</a:t>
+            </a:r>
+            <a:r>
+              <a:rPr lang="en-US" b="1" dirty="0">
+                <a:solidFill>
+                  <a:srgbClr val="CC99FF"/>
+                </a:solidFill>
+              </a:rPr>
+              <a:t>.</a:t>
+            </a:r>
+          </a:p>
+        </p:txBody>
+      </p:sp>
+      <p:sp>
+        <p:nvSpPr>
+          <p:cNvPr id="3" name="Content Placeholder 2">
+            <a:extLst>
+              <a:ext uri="{FF2B5EF4-FFF2-40B4-BE49-F238E27FC236}">
+                <a16:creationId xmlns:a16="http://schemas.microsoft.com/office/drawing/2014/main" id="{9F383B58-11FE-8CE3-CA97-291A34D394C3}"/>
+              </a:ext>
+            </a:extLst>
+          </p:cNvPr>
+          <p:cNvSpPr>
+            <a:spLocks noGrp="1"/>
+          </p:cNvSpPr>
+          <p:nvPr>
+            <p:ph idx="1"/>
+          </p:nvPr>
+        </p:nvSpPr>
+        <p:spPr>
+          <a:xfrm>
+            <a:off x="838200" y="1825624"/>
+            <a:ext cx="6040448" cy="4835479"/>
+          </a:xfrm>
+        </p:spPr>
+        <p:txBody>
+          <a:bodyPr/>
+          <a:lstStyle/>
+          <a:p>
+            <a:r>
+              <a:rPr lang="en-US" dirty="0"/>
+              <a:t>Remember the csv module from last week</a:t>
+            </a:r>
+            <a:r>
+              <a:rPr lang="en-US" dirty="0">
+                <a:solidFill>
+                  <a:srgbClr val="CC99FF"/>
+                </a:solidFill>
+              </a:rPr>
+              <a:t>?</a:t>
+            </a:r>
+          </a:p>
+          <a:p>
+            <a:r>
+              <a:rPr lang="en-US" dirty="0"/>
+              <a:t>Let</a:t>
+            </a:r>
+            <a:r>
+              <a:rPr lang="en-US" dirty="0">
+                <a:solidFill>
+                  <a:srgbClr val="CC99FF"/>
+                </a:solidFill>
+              </a:rPr>
+              <a:t>’</a:t>
+            </a:r>
+            <a:r>
+              <a:rPr lang="en-US" dirty="0"/>
+              <a:t>s see how we can use it to work with a dataset of past presidential elections in the United States</a:t>
+            </a:r>
+            <a:r>
+              <a:rPr lang="en-US" dirty="0">
+                <a:solidFill>
+                  <a:srgbClr val="CC99FF"/>
+                </a:solidFill>
+              </a:rPr>
+              <a:t>.</a:t>
+            </a:r>
+          </a:p>
+        </p:txBody>
+      </p:sp>
+      <p:sp>
+        <p:nvSpPr>
+          <p:cNvPr id="4" name="Rectangle: Rounded Corners 3">
+            <a:extLst>
+              <a:ext uri="{FF2B5EF4-FFF2-40B4-BE49-F238E27FC236}">
+                <a16:creationId xmlns:a16="http://schemas.microsoft.com/office/drawing/2014/main" id="{29AC7AAD-8AA0-8DEE-049C-0F4CC8EFC45F}"/>
+              </a:ext>
+            </a:extLst>
+          </p:cNvPr>
+          <p:cNvSpPr/>
+          <p:nvPr/>
+        </p:nvSpPr>
+        <p:spPr>
+          <a:xfrm>
+            <a:off x="7844590" y="1949006"/>
+            <a:ext cx="3958389" cy="4418765"/>
+          </a:xfrm>
+          <a:prstGeom prst="roundRect">
+            <a:avLst/>
+          </a:prstGeom>
+          <a:noFill/>
+          <a:ln w="76200">
+            <a:solidFill>
+              <a:schemeClr val="accent2"/>
+            </a:solidFill>
+          </a:ln>
+        </p:spPr>
+        <p:style>
+          <a:lnRef idx="2">
+            <a:schemeClr val="accent1">
+              <a:shade val="50000"/>
+            </a:schemeClr>
+          </a:lnRef>
+          <a:fillRef idx="1">
+            <a:schemeClr val="accent1"/>
+          </a:fillRef>
+          <a:effectRef idx="0">
+            <a:schemeClr val="accent1"/>
+          </a:effectRef>
+          <a:fontRef idx="minor">
+            <a:schemeClr val="lt1"/>
+          </a:fontRef>
+        </p:style>
+        <p:txBody>
+          <a:bodyPr rtlCol="0" anchor="ctr"/>
+          <a:lstStyle/>
+          <a:p>
+            <a:r>
+              <a:rPr lang="en-US" sz="4400" b="1" dirty="0">
+                <a:solidFill>
+                  <a:srgbClr val="FFFFFF"/>
+                </a:solidFill>
+              </a:rPr>
+              <a:t>Open your notebook</a:t>
+            </a:r>
+          </a:p>
+          <a:p>
+            <a:endParaRPr lang="en-US" sz="4400" b="1" dirty="0">
+              <a:solidFill>
+                <a:srgbClr val="FFFFFF"/>
+              </a:solidFill>
+            </a:endParaRPr>
+          </a:p>
+          <a:p>
+            <a:r>
+              <a:rPr lang="en-US" sz="2800" b="1" dirty="0">
+                <a:solidFill>
+                  <a:srgbClr val="FFFFFF"/>
+                </a:solidFill>
+              </a:rPr>
+              <a:t>Click Link</a:t>
+            </a:r>
+            <a:r>
+              <a:rPr lang="en-US" sz="2800" b="1" dirty="0">
+                <a:solidFill>
+                  <a:schemeClr val="accent6"/>
+                </a:solidFill>
+              </a:rPr>
+              <a:t>:</a:t>
+            </a:r>
+          </a:p>
+          <a:p>
+            <a:r>
+              <a:rPr lang="en-US" sz="2800" b="1" dirty="0">
+                <a:solidFill>
+                  <a:schemeClr val="accent6"/>
+                </a:solidFill>
+              </a:rPr>
+              <a:t>2. </a:t>
+            </a:r>
+            <a:r>
+              <a:rPr lang="en-US" sz="2600" b="1" dirty="0">
+                <a:solidFill>
+                  <a:schemeClr val="accent6"/>
+                </a:solidFill>
+              </a:rPr>
+              <a:t>Data Visualization</a:t>
+            </a:r>
+          </a:p>
+        </p:txBody>
+      </p:sp>
+    </p:spTree>
+    <p:extLst>
+      <p:ext uri="{BB962C8B-B14F-4D97-AF65-F5344CB8AC3E}">
+        <p14:creationId xmlns:p14="http://schemas.microsoft.com/office/powerpoint/2010/main" val="2102456438"/>
+      </p:ext>
+    </p:extLst>
+  </p:cSld>
+  <p:clrMapOvr>
+    <a:masterClrMapping/>
+  </p:clrMapOvr>
+</p:sld>
+</file>
+
+<file path=ppt/slides/slide9.xml><?xml version="1.0" encoding="utf-8"?>
 <p:sld xmlns:a="http://schemas.openxmlformats.org/drawingml/2006/main" xmlns:r="http://schemas.openxmlformats.org/officeDocument/2006/relationships" xmlns:p="http://schemas.openxmlformats.org/presentationml/2006/main">
   <p:cSld>
     <p:spTree>
@@ -2903,7 +3830,12 @@
             <p:ph type="ctrTitle"/>
           </p:nvPr>
         </p:nvSpPr>
-        <p:spPr/>
+        <p:spPr>
+          <a:xfrm>
+            <a:off x="335947" y="2996610"/>
+            <a:ext cx="11391065" cy="1268070"/>
+          </a:xfrm>
+        </p:spPr>
         <p:txBody>
           <a:bodyPr>
             <a:normAutofit/>
@@ -2917,38 +3849,14 @@
             <a:r>
               <a:rPr lang="en-US" dirty="0">
                 <a:solidFill>
-                  <a:schemeClr val="accent1"/>
+                  <a:srgbClr val="CC99FF"/>
                 </a:solidFill>
               </a:rPr>
               <a:t>,</a:t>
             </a:r>
             <a:r>
               <a:rPr lang="en-US" dirty="0"/>
-              <a:t> NumPy</a:t>
-            </a:r>
-            <a:r>
-              <a:rPr lang="en-US" dirty="0">
-                <a:solidFill>
-                  <a:schemeClr val="accent1"/>
-                </a:solidFill>
-              </a:rPr>
-              <a:t>,</a:t>
-            </a:r>
-            <a:r>
-              <a:rPr lang="en-US" dirty="0"/>
-              <a:t> Matplotlib</a:t>
-            </a:r>
-            <a:r>
-              <a:rPr lang="en-US" dirty="0">
-                <a:solidFill>
-                  <a:schemeClr val="accent6"/>
-                </a:solidFill>
-              </a:rPr>
-              <a:t>/</a:t>
-            </a:r>
-            <a:r>
-              <a:rPr lang="en-US" dirty="0"/>
-              <a:t>Seaborn</a:t>
+              <a:t> data visualization</a:t>
             </a:r>
             <a:r>
               <a:rPr lang="en-US" dirty="0">
@@ -3060,7 +3968,7 @@
     </p:spTree>
     <p:extLst>
       <p:ext uri="{BB962C8B-B14F-4D97-AF65-F5344CB8AC3E}">
-        <p14:creationId xmlns:p14="http://schemas.microsoft.com/office/powerpoint/2010/main" val="1979678763"/>
+        <p14:creationId xmlns:p14="http://schemas.microsoft.com/office/powerpoint/2010/main" val="3085940088"/>
       </p:ext>
     </p:extLst>
   </p:cSld>

</xml_diff>